<commit_message>
Add figures for RO-MAN: Figure Simulation-preference-matrix.
</commit_message>
<xml_diff>
--- a/report/ROMAN-figures.pptx
+++ b/report/ROMAN-figures.pptx
@@ -5,11 +5,12 @@
     <p:sldMasterId id="2147483648" r:id="rId1"/>
   </p:sldMasterIdLst>
   <p:notesMasterIdLst>
-    <p:notesMasterId r:id="rId4"/>
+    <p:notesMasterId r:id="rId5"/>
   </p:notesMasterIdLst>
   <p:sldIdLst>
-    <p:sldId id="256" r:id="rId2"/>
-    <p:sldId id="257" r:id="rId3"/>
+    <p:sldId id="258" r:id="rId2"/>
+    <p:sldId id="256" r:id="rId3"/>
+    <p:sldId id="257" r:id="rId4"/>
   </p:sldIdLst>
   <p:sldSz cx="12192000" cy="6858000"/>
   <p:notesSz cx="6858000" cy="9144000"/>
@@ -520,34 +521,61 @@
           <a:bodyPr/>
           <a:lstStyle/>
           <a:p>
-            <a:r>
-              <a:rPr lang="en-US" dirty="0"/>
-              <a:t>Figure x. </a:t>
-            </a:r>
-            <a:r>
-              <a:rPr lang="en-US" sz="1200" b="0" i="0" kern="1200" dirty="0">
-                <a:solidFill>
-                  <a:schemeClr val="tx1"/>
-                </a:solidFill>
-                <a:effectLst/>
-                <a:latin typeface="+mn-lt"/>
-                <a:ea typeface="+mn-ea"/>
-                <a:cs typeface="+mn-cs"/>
-              </a:rPr>
-              <a:t> Accuracy in the test set as a function of the number of trajectories in the training set for human data set. Each red round dot is the model accuracy in test set for each human subject. The blue triangle is the random rate which should be the baseline to compared with. Random rates are derived for each subject by dividing 100% by the average number of targets in the trajectories. The x-axis is log-transformed for clearer illustration. The label besides each red dot is the subject </a:t>
-            </a:r>
-            <a:r>
-              <a:rPr lang="en-US" altLang="zh-TW" sz="1200" b="0" i="0" kern="1200" dirty="0">
-                <a:solidFill>
-                  <a:schemeClr val="tx1"/>
-                </a:solidFill>
-                <a:effectLst/>
-                <a:latin typeface="+mn-lt"/>
-                <a:ea typeface="+mn-ea"/>
-                <a:cs typeface="+mn-cs"/>
-              </a:rPr>
-              <a:t>ID.</a:t>
-            </a:r>
+            <a:pPr marL="0" marR="0" lvl="0" indent="0" algn="l" defTabSz="914400" rtl="0" eaLnBrk="1" fontAlgn="auto" latinLnBrk="0" hangingPunct="1">
+              <a:lnSpc>
+                <a:spcPct val="100000"/>
+              </a:lnSpc>
+              <a:spcBef>
+                <a:spcPts val="0"/>
+              </a:spcBef>
+              <a:spcAft>
+                <a:spcPts val="0"/>
+              </a:spcAft>
+              <a:buClrTx/>
+              <a:buSzTx/>
+              <a:buFontTx/>
+              <a:buNone/>
+              <a:tabLst/>
+              <a:defRPr/>
+            </a:pPr>
+            <a:r>
+              <a:rPr lang="en-US" sz="1200" dirty="0"/>
+              <a:t>Figure Y. The ground-truth preference matrix and the reconstructed preference matrix for simulated data. Each row is a subject and each column is a target that the subject interacts with. The color of the </a:t>
+            </a:r>
+            <a:r>
+              <a:rPr lang="en-US" sz="1200" dirty="0" err="1"/>
+              <a:t>cell_ij</a:t>
+            </a:r>
+            <a:r>
+              <a:rPr lang="en-US" sz="1200" dirty="0"/>
+              <a:t> encodes the </a:t>
+            </a:r>
+            <a:r>
+              <a:rPr lang="en-US" sz="1200" dirty="0" err="1"/>
+              <a:t>subject_i’s</a:t>
+            </a:r>
+            <a:r>
+              <a:rPr lang="en-US" sz="1200" dirty="0"/>
+              <a:t> ranked preference (1-4; 1 being the favorite target and 4 being the less favorite one)  for </a:t>
+            </a:r>
+            <a:r>
+              <a:rPr lang="en-US" sz="1200" dirty="0" err="1"/>
+              <a:t>target_j</a:t>
+            </a:r>
+            <a:r>
+              <a:rPr lang="en-US" sz="1200" dirty="0"/>
+              <a:t>. If there are tie(s) in the preference rank among targets (e.g., two or more targets share the same preference score), the targets with ties are assigned the average rank value (two targets share the second place in the preference score will have the rank value of 2.5). The ground-truth preference matrix is constructed by the rank-transformed simulated social reward of each target. The reconstructed preference matrix is constructed by the rank-transformed  predicted preference score inferred by </a:t>
+            </a:r>
+            <a:r>
+              <a:rPr lang="en-US" sz="1200" dirty="0" err="1"/>
+              <a:t>ToMNE</a:t>
+            </a:r>
+            <a:r>
+              <a:rPr lang="en-US" sz="1200" dirty="0"/>
+              <a:t>+. The value in parenthesis below each subject ID is the standard deviation of the ground-truth preference scores (before rank-transformation) between the 4 targets.</a:t>
+            </a:r>
+          </a:p>
+          <a:p>
             <a:endParaRPr lang="en-US" dirty="0"/>
           </a:p>
         </p:txBody>
@@ -578,7 +606,7 @@
     </p:spTree>
     <p:extLst>
       <p:ext uri="{BB962C8B-B14F-4D97-AF65-F5344CB8AC3E}">
-        <p14:creationId xmlns:p14="http://schemas.microsoft.com/office/powerpoint/2010/main" val="3122999764"/>
+        <p14:creationId xmlns:p14="http://schemas.microsoft.com/office/powerpoint/2010/main" val="2735564320"/>
       </p:ext>
     </p:extLst>
   </p:cSld>
@@ -633,41 +661,34 @@
           <a:lstStyle/>
           <a:p>
             <a:r>
-              <a:rPr lang="en-US" sz="1400" dirty="0"/>
-              <a:t>Figure x. The ground-truth preference matrix and the reconstructed preference matrix. Each row is a subject and each column is a target that the subject interacts with. The color of the </a:t>
-            </a:r>
-            <a:r>
-              <a:rPr lang="en-US" sz="1400" dirty="0" err="1"/>
-              <a:t>cell_ij</a:t>
-            </a:r>
-            <a:r>
-              <a:rPr lang="en-US" sz="1400" dirty="0"/>
-              <a:t> encodes the </a:t>
-            </a:r>
-            <a:r>
-              <a:rPr lang="en-US" sz="1400" dirty="0" err="1"/>
-              <a:t>subject_i’s</a:t>
-            </a:r>
-            <a:r>
-              <a:rPr lang="en-US" sz="1400" dirty="0"/>
-              <a:t> ranked preference (1-4; 1 being the favorite target and 4 being the less favorite one)  for </a:t>
-            </a:r>
-            <a:r>
-              <a:rPr lang="en-US" sz="1400" dirty="0" err="1"/>
-              <a:t>targer_j</a:t>
-            </a:r>
-            <a:r>
-              <a:rPr lang="en-US" sz="1400" dirty="0"/>
-              <a:t>. If there are tie(s) in the preference rank among targets (e.g., two or more targets share the same preference score), the targets with ties are assigned the average rank value (two targets share the second place in the preference score will have the rank value of 2.5). The ground-truth preference matrix is constructed by the score value of each of the four targets that human sees on the screen, which is decided by the social support questionnaire. The reconstructed preference matrix is constructed by the predicted preference score inferred by </a:t>
-            </a:r>
-            <a:r>
-              <a:rPr lang="en-US" sz="1400" dirty="0" err="1"/>
-              <a:t>ToMNE</a:t>
-            </a:r>
-            <a:r>
-              <a:rPr lang="en-US" sz="1400" dirty="0"/>
-              <a:t>+. The value in parenthesis below each subject ID is the standard deviation of the ground-truth preference scores (before rank-transformation) between the 4 targets.</a:t>
-            </a:r>
+              <a:rPr lang="en-US" dirty="0"/>
+              <a:t>Figure X. </a:t>
+            </a:r>
+            <a:r>
+              <a:rPr lang="en-US" sz="1200" b="0" i="0" kern="1200" dirty="0">
+                <a:solidFill>
+                  <a:schemeClr val="tx1"/>
+                </a:solidFill>
+                <a:effectLst/>
+                <a:latin typeface="+mn-lt"/>
+                <a:ea typeface="+mn-ea"/>
+                <a:cs typeface="+mn-cs"/>
+              </a:rPr>
+              <a:t> Accuracy in the test set as a function of the number of trajectories in the training set for human data set. Each red round dot is the model accuracy in test set for each human subject. The blue triangle is the random rate which should be the baseline to compared with. Random rates are derived for each subject by dividing 100% by the average number of targets in the trajectories. The x-axis is log-transformed for clearer illustration. The label besides each red dot is the subject </a:t>
+            </a:r>
+            <a:r>
+              <a:rPr lang="en-US" altLang="zh-TW" sz="1200" b="0" i="0" kern="1200" dirty="0">
+                <a:solidFill>
+                  <a:schemeClr val="tx1"/>
+                </a:solidFill>
+                <a:effectLst/>
+                <a:latin typeface="+mn-lt"/>
+                <a:ea typeface="+mn-ea"/>
+                <a:cs typeface="+mn-cs"/>
+              </a:rPr>
+              <a:t>ID.</a:t>
+            </a:r>
+            <a:endParaRPr lang="en-US" dirty="0"/>
           </a:p>
         </p:txBody>
       </p:sp>
@@ -689,6 +710,133 @@
             <a:fld id="{DA1463AA-A683-4C2A-8632-07FD5D698543}" type="slidenum">
               <a:rPr lang="en-US" smtClean="0"/>
               <a:t>2</a:t>
+            </a:fld>
+            <a:endParaRPr lang="en-US"/>
+          </a:p>
+        </p:txBody>
+      </p:sp>
+    </p:spTree>
+    <p:extLst>
+      <p:ext uri="{BB962C8B-B14F-4D97-AF65-F5344CB8AC3E}">
+        <p14:creationId xmlns:p14="http://schemas.microsoft.com/office/powerpoint/2010/main" val="3122999764"/>
+      </p:ext>
+    </p:extLst>
+  </p:cSld>
+  <p:clrMapOvr>
+    <a:masterClrMapping/>
+  </p:clrMapOvr>
+</p:notes>
+</file>
+
+<file path=ppt/notesSlides/notesSlide3.xml><?xml version="1.0" encoding="utf-8"?>
+<p:notes xmlns:a="http://schemas.openxmlformats.org/drawingml/2006/main" xmlns:r="http://schemas.openxmlformats.org/officeDocument/2006/relationships" xmlns:p="http://schemas.openxmlformats.org/presentationml/2006/main">
+  <p:cSld>
+    <p:spTree>
+      <p:nvGrpSpPr>
+        <p:cNvPr id="1" name=""/>
+        <p:cNvGrpSpPr/>
+        <p:nvPr/>
+      </p:nvGrpSpPr>
+      <p:grpSpPr>
+        <a:xfrm>
+          <a:off x="0" y="0"/>
+          <a:ext cx="0" cy="0"/>
+          <a:chOff x="0" y="0"/>
+          <a:chExt cx="0" cy="0"/>
+        </a:xfrm>
+      </p:grpSpPr>
+      <p:sp>
+        <p:nvSpPr>
+          <p:cNvPr id="2" name="Slide Image Placeholder 1"/>
+          <p:cNvSpPr>
+            <a:spLocks noGrp="1" noRot="1" noChangeAspect="1"/>
+          </p:cNvSpPr>
+          <p:nvPr>
+            <p:ph type="sldImg"/>
+          </p:nvPr>
+        </p:nvSpPr>
+        <p:spPr/>
+      </p:sp>
+      <p:sp>
+        <p:nvSpPr>
+          <p:cNvPr id="3" name="Notes Placeholder 2"/>
+          <p:cNvSpPr>
+            <a:spLocks noGrp="1"/>
+          </p:cNvSpPr>
+          <p:nvPr>
+            <p:ph type="body" idx="1"/>
+          </p:nvPr>
+        </p:nvSpPr>
+        <p:spPr/>
+        <p:txBody>
+          <a:bodyPr/>
+          <a:lstStyle/>
+          <a:p>
+            <a:r>
+              <a:rPr lang="en-US" sz="1400" dirty="0"/>
+              <a:t>Figure Y. The ground-truth preference matrix and the reconstructed preference matrix for human data. Each row is a subject and each column is a target that the subject interacts with. The color of the </a:t>
+            </a:r>
+            <a:r>
+              <a:rPr lang="en-US" sz="1400" dirty="0" err="1"/>
+              <a:t>cell_ij</a:t>
+            </a:r>
+            <a:r>
+              <a:rPr lang="en-US" sz="1400" dirty="0"/>
+              <a:t> encodes the </a:t>
+            </a:r>
+            <a:r>
+              <a:rPr lang="en-US" sz="1400" dirty="0" err="1"/>
+              <a:t>subject_i’s</a:t>
+            </a:r>
+            <a:r>
+              <a:rPr lang="en-US" sz="1400" dirty="0"/>
+              <a:t> ranked preference (1-4; 1 being the favorite target and 4 being the less favorite one)  for </a:t>
+            </a:r>
+            <a:r>
+              <a:rPr lang="en-US" sz="1400" dirty="0" err="1"/>
+              <a:t>target_j</a:t>
+            </a:r>
+            <a:r>
+              <a:rPr lang="en-US" sz="1400" dirty="0"/>
+              <a:t>. If there are tie(s) in the preference rank among targets (e.g., two or more targets share the same preference score), the targets with ties are assigned the average rank value (two targets share the second place in the preference score will have the rank value of 2.5). The ground-truth preference matrix is constructed by the rank-transformed score value of each of the four targets that human sees on the screen, which is decided by the social support questionnaire. The reconstructed preference matrix is constructed by </a:t>
+            </a:r>
+            <a:r>
+              <a:rPr lang="en-US" sz="1400"/>
+              <a:t>the rank-transformed predicted </a:t>
+            </a:r>
+            <a:r>
+              <a:rPr lang="en-US" sz="1400" dirty="0"/>
+              <a:t>preference score inferred by </a:t>
+            </a:r>
+            <a:r>
+              <a:rPr lang="en-US" sz="1400" dirty="0" err="1"/>
+              <a:t>ToMNET</a:t>
+            </a:r>
+            <a:r>
+              <a:rPr lang="en-US" sz="1400" dirty="0"/>
+              <a:t>+. The value in parenthesis below each subject ID is the standard deviation of the ground-truth preference scores (before rank-transformation) between the 4 targets.</a:t>
+            </a:r>
+          </a:p>
+        </p:txBody>
+      </p:sp>
+      <p:sp>
+        <p:nvSpPr>
+          <p:cNvPr id="4" name="Slide Number Placeholder 3"/>
+          <p:cNvSpPr>
+            <a:spLocks noGrp="1"/>
+          </p:cNvSpPr>
+          <p:nvPr>
+            <p:ph type="sldNum" sz="quarter" idx="5"/>
+          </p:nvPr>
+        </p:nvSpPr>
+        <p:spPr/>
+        <p:txBody>
+          <a:bodyPr/>
+          <a:lstStyle/>
+          <a:p>
+            <a:fld id="{DA1463AA-A683-4C2A-8632-07FD5D698543}" type="slidenum">
+              <a:rPr lang="en-US" smtClean="0"/>
+              <a:t>3</a:t>
             </a:fld>
             <a:endParaRPr lang="en-US"/>
           </a:p>
@@ -3923,6 +4071,108 @@
       </p:grpSpPr>
       <p:pic>
         <p:nvPicPr>
+          <p:cNvPr id="25" name="Picture 24" descr="A screenshot of a cell phone&#10;&#10;Description automatically generated">
+            <a:extLst>
+              <a:ext uri="{FF2B5EF4-FFF2-40B4-BE49-F238E27FC236}">
+                <a16:creationId xmlns:a16="http://schemas.microsoft.com/office/drawing/2014/main" id="{15450889-A2BF-47CA-8A2C-20FAECF5C261}"/>
+              </a:ext>
+            </a:extLst>
+          </p:cNvPr>
+          <p:cNvPicPr>
+            <a:picLocks noChangeAspect="1"/>
+          </p:cNvPicPr>
+          <p:nvPr/>
+        </p:nvPicPr>
+        <p:blipFill>
+          <a:blip r:embed="rId3">
+            <a:extLst>
+              <a:ext uri="{28A0092B-C50C-407E-A947-70E740481C1C}">
+                <a14:useLocalDpi xmlns:a14="http://schemas.microsoft.com/office/drawing/2010/main" val="0"/>
+              </a:ext>
+            </a:extLst>
+          </a:blip>
+          <a:stretch>
+            <a:fillRect/>
+          </a:stretch>
+        </p:blipFill>
+        <p:spPr>
+          <a:xfrm>
+            <a:off x="1108363" y="0"/>
+            <a:ext cx="4987637" cy="6858000"/>
+          </a:xfrm>
+          <a:prstGeom prst="rect">
+            <a:avLst/>
+          </a:prstGeom>
+        </p:spPr>
+      </p:pic>
+      <p:pic>
+        <p:nvPicPr>
+          <p:cNvPr id="27" name="Picture 26" descr="A close up of a logo&#10;&#10;Description automatically generated">
+            <a:extLst>
+              <a:ext uri="{FF2B5EF4-FFF2-40B4-BE49-F238E27FC236}">
+                <a16:creationId xmlns:a16="http://schemas.microsoft.com/office/drawing/2014/main" id="{03AD3D24-EE60-4FC6-AF2E-6BAF9D9F4947}"/>
+              </a:ext>
+            </a:extLst>
+          </p:cNvPr>
+          <p:cNvPicPr>
+            <a:picLocks noChangeAspect="1"/>
+          </p:cNvPicPr>
+          <p:nvPr/>
+        </p:nvPicPr>
+        <p:blipFill>
+          <a:blip r:embed="rId4">
+            <a:extLst>
+              <a:ext uri="{28A0092B-C50C-407E-A947-70E740481C1C}">
+                <a14:useLocalDpi xmlns:a14="http://schemas.microsoft.com/office/drawing/2010/main" val="0"/>
+              </a:ext>
+            </a:extLst>
+          </a:blip>
+          <a:stretch>
+            <a:fillRect/>
+          </a:stretch>
+        </p:blipFill>
+        <p:spPr>
+          <a:xfrm>
+            <a:off x="6096000" y="0"/>
+            <a:ext cx="4987637" cy="6858000"/>
+          </a:xfrm>
+          <a:prstGeom prst="rect">
+            <a:avLst/>
+          </a:prstGeom>
+        </p:spPr>
+      </p:pic>
+    </p:spTree>
+    <p:extLst>
+      <p:ext uri="{BB962C8B-B14F-4D97-AF65-F5344CB8AC3E}">
+        <p14:creationId xmlns:p14="http://schemas.microsoft.com/office/powerpoint/2010/main" val="1936547209"/>
+      </p:ext>
+    </p:extLst>
+  </p:cSld>
+  <p:clrMapOvr>
+    <a:masterClrMapping/>
+  </p:clrMapOvr>
+</p:sld>
+</file>
+
+<file path=ppt/slides/slide2.xml><?xml version="1.0" encoding="utf-8"?>
+<p:sld xmlns:a="http://schemas.openxmlformats.org/drawingml/2006/main" xmlns:r="http://schemas.openxmlformats.org/officeDocument/2006/relationships" xmlns:p="http://schemas.openxmlformats.org/presentationml/2006/main">
+  <p:cSld>
+    <p:spTree>
+      <p:nvGrpSpPr>
+        <p:cNvPr id="1" name=""/>
+        <p:cNvGrpSpPr/>
+        <p:nvPr/>
+      </p:nvGrpSpPr>
+      <p:grpSpPr>
+        <a:xfrm>
+          <a:off x="0" y="0"/>
+          <a:ext cx="0" cy="0"/>
+          <a:chOff x="0" y="0"/>
+          <a:chExt cx="0" cy="0"/>
+        </a:xfrm>
+      </p:grpSpPr>
+      <p:pic>
+        <p:nvPicPr>
           <p:cNvPr id="9" name="Picture 8" descr="A close up of a map&#10;&#10;Description automatically generated">
             <a:extLst>
               <a:ext uri="{FF2B5EF4-FFF2-40B4-BE49-F238E27FC236}">
@@ -3970,7 +4220,7 @@
 </p:sld>
 </file>
 
-<file path=ppt/slides/slide2.xml><?xml version="1.0" encoding="utf-8"?>
+<file path=ppt/slides/slide3.xml><?xml version="1.0" encoding="utf-8"?>
 <p:sld xmlns:a="http://schemas.openxmlformats.org/drawingml/2006/main" xmlns:r="http://schemas.openxmlformats.org/officeDocument/2006/relationships" xmlns:p="http://schemas.openxmlformats.org/presentationml/2006/main">
   <p:cSld>
     <p:spTree>

</xml_diff>

<commit_message>
Add figures for RO-MAN: Figure Simulation-accuracy
</commit_message>
<xml_diff>
--- a/report/ROMAN-figures.pptx
+++ b/report/ROMAN-figures.pptx
@@ -5,12 +5,13 @@
     <p:sldMasterId id="2147483648" r:id="rId1"/>
   </p:sldMasterIdLst>
   <p:notesMasterIdLst>
-    <p:notesMasterId r:id="rId5"/>
+    <p:notesMasterId r:id="rId6"/>
   </p:notesMasterIdLst>
   <p:sldIdLst>
-    <p:sldId id="258" r:id="rId2"/>
-    <p:sldId id="256" r:id="rId3"/>
-    <p:sldId id="257" r:id="rId4"/>
+    <p:sldId id="259" r:id="rId2"/>
+    <p:sldId id="258" r:id="rId3"/>
+    <p:sldId id="256" r:id="rId4"/>
+    <p:sldId id="257" r:id="rId5"/>
   </p:sldIdLst>
   <p:sldSz cx="12192000" cy="6858000"/>
   <p:notesSz cx="6858000" cy="9144000"/>
@@ -521,61 +522,46 @@
           <a:bodyPr/>
           <a:lstStyle/>
           <a:p>
-            <a:pPr marL="0" marR="0" lvl="0" indent="0" algn="l" defTabSz="914400" rtl="0" eaLnBrk="1" fontAlgn="auto" latinLnBrk="0" hangingPunct="1">
-              <a:lnSpc>
-                <a:spcPct val="100000"/>
-              </a:lnSpc>
-              <a:spcBef>
-                <a:spcPts val="0"/>
-              </a:spcBef>
-              <a:spcAft>
-                <a:spcPts val="0"/>
-              </a:spcAft>
-              <a:buClrTx/>
-              <a:buSzTx/>
-              <a:buFontTx/>
-              <a:buNone/>
-              <a:tabLst/>
-              <a:defRPr/>
-            </a:pPr>
-            <a:r>
-              <a:rPr lang="en-US" sz="1200" dirty="0"/>
-              <a:t>Figure Y. The ground-truth preference matrix and the reconstructed preference matrix for simulated data. Each row is a subject and each column is a target that the subject interacts with. The color of the </a:t>
-            </a:r>
-            <a:r>
-              <a:rPr lang="en-US" sz="1200" dirty="0" err="1"/>
-              <a:t>cell_ij</a:t>
-            </a:r>
-            <a:r>
-              <a:rPr lang="en-US" sz="1200" dirty="0"/>
-              <a:t> encodes the </a:t>
-            </a:r>
-            <a:r>
-              <a:rPr lang="en-US" sz="1200" dirty="0" err="1"/>
-              <a:t>subject_i’s</a:t>
-            </a:r>
-            <a:r>
-              <a:rPr lang="en-US" sz="1200" dirty="0"/>
-              <a:t> ranked preference (1-4; 1 being the favorite target and 4 being the less favorite one)  for </a:t>
-            </a:r>
-            <a:r>
-              <a:rPr lang="en-US" sz="1200" dirty="0" err="1"/>
-              <a:t>target_j</a:t>
-            </a:r>
-            <a:r>
-              <a:rPr lang="en-US" sz="1200" dirty="0"/>
-              <a:t>. If there are tie(s) in the preference rank among targets (e.g., two or more targets share the same preference score), the targets with ties are assigned the average rank value (two targets share the second place in the preference score will have the rank value of 2.5). The ground-truth preference matrix is constructed by the rank-transformed simulated social reward of each target. The reconstructed preference matrix is constructed by the rank-transformed  predicted preference score inferred by </a:t>
-            </a:r>
-            <a:r>
-              <a:rPr lang="en-US" sz="1200" dirty="0" err="1"/>
-              <a:t>ToMNE</a:t>
-            </a:r>
-            <a:r>
-              <a:rPr lang="en-US" sz="1200" dirty="0"/>
-              <a:t>+. The value in parenthesis below each subject ID is the standard deviation of the ground-truth preference scores (before rank-transformation) between the 4 targets.</a:t>
-            </a:r>
-          </a:p>
-          <a:p>
+            <a:r>
+              <a:rPr lang="en-US" dirty="0"/>
+              <a:t>Figure Simulation-accuracy. </a:t>
+            </a:r>
+            <a:r>
+              <a:rPr lang="en-US" sz="1200" b="0" i="0" kern="1200" dirty="0">
+                <a:solidFill>
+                  <a:schemeClr val="tx1"/>
+                </a:solidFill>
+                <a:effectLst/>
+                <a:latin typeface="+mn-lt"/>
+                <a:ea typeface="+mn-ea"/>
+                <a:cs typeface="+mn-cs"/>
+              </a:rPr>
+              <a:t>Accuracy in the test set as a function of the standard deviation (SD) of social support values across 4 targets in the training set for simulated data. Each red round dot is the average model test accuracy in </a:t>
+            </a:r>
+            <a:r>
+              <a:rPr lang="en-US" sz="1200" b="0" i="0" kern="1200">
+                <a:solidFill>
+                  <a:schemeClr val="tx1"/>
+                </a:solidFill>
+                <a:effectLst/>
+                <a:latin typeface="+mn-lt"/>
+                <a:ea typeface="+mn-ea"/>
+                <a:cs typeface="+mn-cs"/>
+              </a:rPr>
+              <a:t>test set (averaged across all the simulated data with the same SD). </a:t>
+            </a:r>
+            <a:r>
+              <a:rPr lang="en-US" sz="1200" b="0" i="0" kern="1200" dirty="0">
+                <a:solidFill>
+                  <a:schemeClr val="tx1"/>
+                </a:solidFill>
+                <a:effectLst/>
+                <a:latin typeface="+mn-lt"/>
+                <a:ea typeface="+mn-ea"/>
+                <a:cs typeface="+mn-cs"/>
+              </a:rPr>
+              <a:t>The blue triangle is the average random rate which should be the baseline to compared with. Random rate for each model is derived for each subject by dividing 100% by the average number of targets in the trajectories. The error bars represent the standard errors.</a:t>
+            </a:r>
             <a:endParaRPr lang="en-US" dirty="0"/>
           </a:p>
         </p:txBody>
@@ -606,7 +592,7 @@
     </p:spTree>
     <p:extLst>
       <p:ext uri="{BB962C8B-B14F-4D97-AF65-F5344CB8AC3E}">
-        <p14:creationId xmlns:p14="http://schemas.microsoft.com/office/powerpoint/2010/main" val="2735564320"/>
+        <p14:creationId xmlns:p14="http://schemas.microsoft.com/office/powerpoint/2010/main" val="557976235"/>
       </p:ext>
     </p:extLst>
   </p:cSld>
@@ -660,34 +646,61 @@
           <a:bodyPr/>
           <a:lstStyle/>
           <a:p>
-            <a:r>
-              <a:rPr lang="en-US" dirty="0"/>
-              <a:t>Figure X. </a:t>
-            </a:r>
-            <a:r>
-              <a:rPr lang="en-US" sz="1200" b="0" i="0" kern="1200" dirty="0">
-                <a:solidFill>
-                  <a:schemeClr val="tx1"/>
-                </a:solidFill>
-                <a:effectLst/>
-                <a:latin typeface="+mn-lt"/>
-                <a:ea typeface="+mn-ea"/>
-                <a:cs typeface="+mn-cs"/>
-              </a:rPr>
-              <a:t> Accuracy in the test set as a function of the number of trajectories in the training set for human data set. Each red round dot is the model accuracy in test set for each human subject. The blue triangle is the random rate which should be the baseline to compared with. Random rates are derived for each subject by dividing 100% by the average number of targets in the trajectories. The x-axis is log-transformed for clearer illustration. The label besides each red dot is the subject </a:t>
-            </a:r>
-            <a:r>
-              <a:rPr lang="en-US" altLang="zh-TW" sz="1200" b="0" i="0" kern="1200" dirty="0">
-                <a:solidFill>
-                  <a:schemeClr val="tx1"/>
-                </a:solidFill>
-                <a:effectLst/>
-                <a:latin typeface="+mn-lt"/>
-                <a:ea typeface="+mn-ea"/>
-                <a:cs typeface="+mn-cs"/>
-              </a:rPr>
-              <a:t>ID.</a:t>
-            </a:r>
+            <a:pPr marL="0" marR="0" lvl="0" indent="0" algn="l" defTabSz="914400" rtl="0" eaLnBrk="1" fontAlgn="auto" latinLnBrk="0" hangingPunct="1">
+              <a:lnSpc>
+                <a:spcPct val="100000"/>
+              </a:lnSpc>
+              <a:spcBef>
+                <a:spcPts val="0"/>
+              </a:spcBef>
+              <a:spcAft>
+                <a:spcPts val="0"/>
+              </a:spcAft>
+              <a:buClrTx/>
+              <a:buSzTx/>
+              <a:buFontTx/>
+              <a:buNone/>
+              <a:tabLst/>
+              <a:defRPr/>
+            </a:pPr>
+            <a:r>
+              <a:rPr lang="en-US" sz="1200" dirty="0"/>
+              <a:t>Figure Simulation-preference-matrix. The ground-truth preference matrix and the reconstructed preference matrix for simulated data. Each row is a subject and each column is a target that the subject interacts with. The color of the </a:t>
+            </a:r>
+            <a:r>
+              <a:rPr lang="en-US" sz="1200" dirty="0" err="1"/>
+              <a:t>cell_ij</a:t>
+            </a:r>
+            <a:r>
+              <a:rPr lang="en-US" sz="1200" dirty="0"/>
+              <a:t> encodes the </a:t>
+            </a:r>
+            <a:r>
+              <a:rPr lang="en-US" sz="1200" dirty="0" err="1"/>
+              <a:t>subject_i’s</a:t>
+            </a:r>
+            <a:r>
+              <a:rPr lang="en-US" sz="1200" dirty="0"/>
+              <a:t> ranked preference (1-4; 1 being the favorite target and 4 being the less favorite one)  for </a:t>
+            </a:r>
+            <a:r>
+              <a:rPr lang="en-US" sz="1200" dirty="0" err="1"/>
+              <a:t>target_j</a:t>
+            </a:r>
+            <a:r>
+              <a:rPr lang="en-US" sz="1200" dirty="0"/>
+              <a:t>. If there are tie(s) in the preference rank among targets (e.g., two or more targets share the same preference score), the targets with ties are assigned the average rank value (two targets share the second place in the preference score will have the rank value of 2.5). The ground-truth preference matrix is constructed by the rank-transformed simulated social support value of each target. The reconstructed preference matrix is constructed by the rank-transformed  predicted preference score inferred by </a:t>
+            </a:r>
+            <a:r>
+              <a:rPr lang="en-US" sz="1200" dirty="0" err="1"/>
+              <a:t>ToMNET</a:t>
+            </a:r>
+            <a:r>
+              <a:rPr lang="en-US" sz="1200" dirty="0"/>
+              <a:t>+. The value in parenthesis below each subject ID is the standard deviation of the ground-truth preference scores (before rank-transformation) between the 4 targets.</a:t>
+            </a:r>
+          </a:p>
+          <a:p>
             <a:endParaRPr lang="en-US" dirty="0"/>
           </a:p>
         </p:txBody>
@@ -718,7 +731,7 @@
     </p:spTree>
     <p:extLst>
       <p:ext uri="{BB962C8B-B14F-4D97-AF65-F5344CB8AC3E}">
-        <p14:creationId xmlns:p14="http://schemas.microsoft.com/office/powerpoint/2010/main" val="3122999764"/>
+        <p14:creationId xmlns:p14="http://schemas.microsoft.com/office/powerpoint/2010/main" val="2735564320"/>
       </p:ext>
     </p:extLst>
   </p:cSld>
@@ -773,49 +786,34 @@
           <a:lstStyle/>
           <a:p>
             <a:r>
-              <a:rPr lang="en-US" sz="1400" dirty="0"/>
-              <a:t>Figure Y. The ground-truth preference matrix and the reconstructed preference matrix for human data. Each row is a subject and each column is a target that the subject interacts with. The color of the </a:t>
-            </a:r>
-            <a:r>
-              <a:rPr lang="en-US" sz="1400" dirty="0" err="1"/>
-              <a:t>cell_ij</a:t>
-            </a:r>
-            <a:r>
-              <a:rPr lang="en-US" sz="1400" dirty="0"/>
-              <a:t> encodes the </a:t>
-            </a:r>
-            <a:r>
-              <a:rPr lang="en-US" sz="1400" dirty="0" err="1"/>
-              <a:t>subject_i’s</a:t>
-            </a:r>
-            <a:r>
-              <a:rPr lang="en-US" sz="1400" dirty="0"/>
-              <a:t> ranked preference (1-4; 1 being the favorite target and 4 being the less favorite one)  for </a:t>
-            </a:r>
-            <a:r>
-              <a:rPr lang="en-US" sz="1400" dirty="0" err="1"/>
-              <a:t>target_j</a:t>
-            </a:r>
-            <a:r>
-              <a:rPr lang="en-US" sz="1400" dirty="0"/>
-              <a:t>. If there are tie(s) in the preference rank among targets (e.g., two or more targets share the same preference score), the targets with ties are assigned the average rank value (two targets share the second place in the preference score will have the rank value of 2.5). The ground-truth preference matrix is constructed by the rank-transformed score value of each of the four targets that human sees on the screen, which is decided by the social support questionnaire. The reconstructed preference matrix is constructed by </a:t>
-            </a:r>
-            <a:r>
-              <a:rPr lang="en-US" sz="1400"/>
-              <a:t>the rank-transformed predicted </a:t>
-            </a:r>
-            <a:r>
-              <a:rPr lang="en-US" sz="1400" dirty="0"/>
-              <a:t>preference score inferred by </a:t>
-            </a:r>
-            <a:r>
-              <a:rPr lang="en-US" sz="1400" dirty="0" err="1"/>
-              <a:t>ToMNET</a:t>
-            </a:r>
-            <a:r>
-              <a:rPr lang="en-US" sz="1400" dirty="0"/>
-              <a:t>+. The value in parenthesis below each subject ID is the standard deviation of the ground-truth preference scores (before rank-transformation) between the 4 targets.</a:t>
-            </a:r>
+              <a:rPr lang="en-US" dirty="0"/>
+              <a:t>Figure Human-accuracy. </a:t>
+            </a:r>
+            <a:r>
+              <a:rPr lang="en-US" sz="1200" b="0" i="0" kern="1200" dirty="0">
+                <a:solidFill>
+                  <a:schemeClr val="tx1"/>
+                </a:solidFill>
+                <a:effectLst/>
+                <a:latin typeface="+mn-lt"/>
+                <a:ea typeface="+mn-ea"/>
+                <a:cs typeface="+mn-cs"/>
+              </a:rPr>
+              <a:t>Accuracy in the test set as a function of the number of trajectories in the training set for human data set. Each red round dot is the model accuracy in test set for each human subject. The blue triangle is the random rate, which should be the baseline to compared with. Random rates are derived for each subject by dividing 100% by the average number of targets in the trajectories. The x-axis is log-transformed for clearer illustration. The label besides each red dot is the subject </a:t>
+            </a:r>
+            <a:r>
+              <a:rPr lang="en-US" altLang="zh-TW" sz="1200" b="0" i="0" kern="1200" dirty="0">
+                <a:solidFill>
+                  <a:schemeClr val="tx1"/>
+                </a:solidFill>
+                <a:effectLst/>
+                <a:latin typeface="+mn-lt"/>
+                <a:ea typeface="+mn-ea"/>
+                <a:cs typeface="+mn-cs"/>
+              </a:rPr>
+              <a:t>ID.</a:t>
+            </a:r>
+            <a:endParaRPr lang="en-US" dirty="0"/>
           </a:p>
         </p:txBody>
       </p:sp>
@@ -837,6 +835,125 @@
             <a:fld id="{DA1463AA-A683-4C2A-8632-07FD5D698543}" type="slidenum">
               <a:rPr lang="en-US" smtClean="0"/>
               <a:t>3</a:t>
+            </a:fld>
+            <a:endParaRPr lang="en-US"/>
+          </a:p>
+        </p:txBody>
+      </p:sp>
+    </p:spTree>
+    <p:extLst>
+      <p:ext uri="{BB962C8B-B14F-4D97-AF65-F5344CB8AC3E}">
+        <p14:creationId xmlns:p14="http://schemas.microsoft.com/office/powerpoint/2010/main" val="3122999764"/>
+      </p:ext>
+    </p:extLst>
+  </p:cSld>
+  <p:clrMapOvr>
+    <a:masterClrMapping/>
+  </p:clrMapOvr>
+</p:notes>
+</file>
+
+<file path=ppt/notesSlides/notesSlide4.xml><?xml version="1.0" encoding="utf-8"?>
+<p:notes xmlns:a="http://schemas.openxmlformats.org/drawingml/2006/main" xmlns:r="http://schemas.openxmlformats.org/officeDocument/2006/relationships" xmlns:p="http://schemas.openxmlformats.org/presentationml/2006/main">
+  <p:cSld>
+    <p:spTree>
+      <p:nvGrpSpPr>
+        <p:cNvPr id="1" name=""/>
+        <p:cNvGrpSpPr/>
+        <p:nvPr/>
+      </p:nvGrpSpPr>
+      <p:grpSpPr>
+        <a:xfrm>
+          <a:off x="0" y="0"/>
+          <a:ext cx="0" cy="0"/>
+          <a:chOff x="0" y="0"/>
+          <a:chExt cx="0" cy="0"/>
+        </a:xfrm>
+      </p:grpSpPr>
+      <p:sp>
+        <p:nvSpPr>
+          <p:cNvPr id="2" name="Slide Image Placeholder 1"/>
+          <p:cNvSpPr>
+            <a:spLocks noGrp="1" noRot="1" noChangeAspect="1"/>
+          </p:cNvSpPr>
+          <p:nvPr>
+            <p:ph type="sldImg"/>
+          </p:nvPr>
+        </p:nvSpPr>
+        <p:spPr/>
+      </p:sp>
+      <p:sp>
+        <p:nvSpPr>
+          <p:cNvPr id="3" name="Notes Placeholder 2"/>
+          <p:cNvSpPr>
+            <a:spLocks noGrp="1"/>
+          </p:cNvSpPr>
+          <p:nvPr>
+            <p:ph type="body" idx="1"/>
+          </p:nvPr>
+        </p:nvSpPr>
+        <p:spPr/>
+        <p:txBody>
+          <a:bodyPr/>
+          <a:lstStyle/>
+          <a:p>
+            <a:r>
+              <a:rPr lang="en-US" sz="1400" dirty="0"/>
+              <a:t>Figure Human-preference-matrix. The ground-truth preference matrix and the reconstructed preference matrix for human data. Each row is a subject and each column is a target that the subject interacts with. The color of the </a:t>
+            </a:r>
+            <a:r>
+              <a:rPr lang="en-US" sz="1400" dirty="0" err="1"/>
+              <a:t>cell_ij</a:t>
+            </a:r>
+            <a:r>
+              <a:rPr lang="en-US" sz="1400" dirty="0"/>
+              <a:t> encodes the </a:t>
+            </a:r>
+            <a:r>
+              <a:rPr lang="en-US" sz="1400" dirty="0" err="1"/>
+              <a:t>subject_i’s</a:t>
+            </a:r>
+            <a:r>
+              <a:rPr lang="en-US" sz="1400" dirty="0"/>
+              <a:t> ranked preference (1-4; 1 being the favorite target and 4 being the less favorite one)  for </a:t>
+            </a:r>
+            <a:r>
+              <a:rPr lang="en-US" sz="1400" dirty="0" err="1"/>
+              <a:t>target_j</a:t>
+            </a:r>
+            <a:r>
+              <a:rPr lang="en-US" sz="1400" dirty="0"/>
+              <a:t>. If there are tie(s) in the preference rank among targets (e.g., two or more targets share the same preference score), the targets with ties are assigned the average rank value (two targets share the second place in the preference score will have the rank value of 2.5). The ground-truth preference matrix is constructed by the rank-transformed score value of each of the four targets that human sees on the screen, which is decided by the social support questionnaire. The reconstructed preference matrix is constructed by the rank-transformed predicted preference score inferred by </a:t>
+            </a:r>
+            <a:r>
+              <a:rPr lang="en-US" sz="1400" dirty="0" err="1"/>
+              <a:t>ToMNET</a:t>
+            </a:r>
+            <a:r>
+              <a:rPr lang="en-US" sz="1400" dirty="0"/>
+              <a:t>+. The value in parenthesis below each subject ID is the standard deviation of the ground-truth preference scores (before rank-transformation) between the 4 targets.</a:t>
+            </a:r>
+          </a:p>
+        </p:txBody>
+      </p:sp>
+      <p:sp>
+        <p:nvSpPr>
+          <p:cNvPr id="4" name="Slide Number Placeholder 3"/>
+          <p:cNvSpPr>
+            <a:spLocks noGrp="1"/>
+          </p:cNvSpPr>
+          <p:nvPr>
+            <p:ph type="sldNum" sz="quarter" idx="5"/>
+          </p:nvPr>
+        </p:nvSpPr>
+        <p:spPr/>
+        <p:txBody>
+          <a:bodyPr/>
+          <a:lstStyle/>
+          <a:p>
+            <a:fld id="{DA1463AA-A683-4C2A-8632-07FD5D698543}" type="slidenum">
+              <a:rPr lang="en-US" smtClean="0"/>
+              <a:t>4</a:t>
             </a:fld>
             <a:endParaRPr lang="en-US"/>
           </a:p>
@@ -4071,6 +4188,72 @@
       </p:grpSpPr>
       <p:pic>
         <p:nvPicPr>
+          <p:cNvPr id="3" name="Picture 2" descr="A picture containing colorful, flying, kite&#10;&#10;Description automatically generated">
+            <a:extLst>
+              <a:ext uri="{FF2B5EF4-FFF2-40B4-BE49-F238E27FC236}">
+                <a16:creationId xmlns:a16="http://schemas.microsoft.com/office/drawing/2014/main" id="{6CD345BD-1AB5-4D65-869F-140DA48208F9}"/>
+              </a:ext>
+            </a:extLst>
+          </p:cNvPr>
+          <p:cNvPicPr>
+            <a:picLocks noChangeAspect="1"/>
+          </p:cNvPicPr>
+          <p:nvPr/>
+        </p:nvPicPr>
+        <p:blipFill>
+          <a:blip r:embed="rId3">
+            <a:extLst>
+              <a:ext uri="{28A0092B-C50C-407E-A947-70E740481C1C}">
+                <a14:useLocalDpi xmlns:a14="http://schemas.microsoft.com/office/drawing/2010/main" val="0"/>
+              </a:ext>
+            </a:extLst>
+          </a:blip>
+          <a:stretch>
+            <a:fillRect/>
+          </a:stretch>
+        </p:blipFill>
+        <p:spPr>
+          <a:xfrm>
+            <a:off x="1524001" y="0"/>
+            <a:ext cx="9133489" cy="6850117"/>
+          </a:xfrm>
+          <a:prstGeom prst="rect">
+            <a:avLst/>
+          </a:prstGeom>
+        </p:spPr>
+      </p:pic>
+    </p:spTree>
+    <p:extLst>
+      <p:ext uri="{BB962C8B-B14F-4D97-AF65-F5344CB8AC3E}">
+        <p14:creationId xmlns:p14="http://schemas.microsoft.com/office/powerpoint/2010/main" val="2982126486"/>
+      </p:ext>
+    </p:extLst>
+  </p:cSld>
+  <p:clrMapOvr>
+    <a:masterClrMapping/>
+  </p:clrMapOvr>
+</p:sld>
+</file>
+
+<file path=ppt/slides/slide2.xml><?xml version="1.0" encoding="utf-8"?>
+<p:sld xmlns:a="http://schemas.openxmlformats.org/drawingml/2006/main" xmlns:r="http://schemas.openxmlformats.org/officeDocument/2006/relationships" xmlns:p="http://schemas.openxmlformats.org/presentationml/2006/main">
+  <p:cSld>
+    <p:spTree>
+      <p:nvGrpSpPr>
+        <p:cNvPr id="1" name=""/>
+        <p:cNvGrpSpPr/>
+        <p:nvPr/>
+      </p:nvGrpSpPr>
+      <p:grpSpPr>
+        <a:xfrm>
+          <a:off x="0" y="0"/>
+          <a:ext cx="0" cy="0"/>
+          <a:chOff x="0" y="0"/>
+          <a:chExt cx="0" cy="0"/>
+        </a:xfrm>
+      </p:grpSpPr>
+      <p:pic>
+        <p:nvPicPr>
           <p:cNvPr id="25" name="Picture 24" descr="A screenshot of a cell phone&#10;&#10;Description automatically generated">
             <a:extLst>
               <a:ext uri="{FF2B5EF4-FFF2-40B4-BE49-F238E27FC236}">
@@ -4154,7 +4337,7 @@
 </p:sld>
 </file>
 
-<file path=ppt/slides/slide2.xml><?xml version="1.0" encoding="utf-8"?>
+<file path=ppt/slides/slide3.xml><?xml version="1.0" encoding="utf-8"?>
 <p:sld xmlns:a="http://schemas.openxmlformats.org/drawingml/2006/main" xmlns:r="http://schemas.openxmlformats.org/officeDocument/2006/relationships" xmlns:p="http://schemas.openxmlformats.org/presentationml/2006/main">
   <p:cSld>
     <p:spTree>
@@ -4220,7 +4403,7 @@
 </p:sld>
 </file>
 
-<file path=ppt/slides/slide3.xml><?xml version="1.0" encoding="utf-8"?>
+<file path=ppt/slides/slide4.xml><?xml version="1.0" encoding="utf-8"?>
 <p:sld xmlns:a="http://schemas.openxmlformats.org/drawingml/2006/main" xmlns:r="http://schemas.openxmlformats.org/officeDocument/2006/relationships" xmlns:p="http://schemas.openxmlformats.org/presentationml/2006/main">
   <p:cSld>
     <p:spTree>

</xml_diff>